<commit_message>
deleted plot files in manuscript folder to keep in outputs only
</commit_message>
<xml_diff>
--- a/outputs/04_figure4.pptx
+++ b/outputs/04_figure4.pptx
@@ -3226,25 +3226,18 @@
           </a:bodyPr>
           <a:lstStyle/>
           <a:p>
+            <a:pPr algn="ctr"/>
             <a:r>
               <a:rPr lang="fr-CA" sz="1500" dirty="0" err="1" smtClean="0"/>
-              <a:t>Probability</a:t>
+              <a:t>Hunting</a:t>
             </a:r>
             <a:r>
               <a:rPr lang="fr-CA" sz="1500" dirty="0" smtClean="0"/>
-              <a:t> of </a:t>
+              <a:t> </a:t>
             </a:r>
             <a:r>
               <a:rPr lang="fr-CA" sz="1500" dirty="0" err="1" smtClean="0"/>
-              <a:t>capturing</a:t>
-            </a:r>
-            <a:r>
-              <a:rPr lang="fr-CA" sz="1500" dirty="0" smtClean="0"/>
-              <a:t> 4 </a:t>
-            </a:r>
-            <a:r>
-              <a:rPr lang="fr-CA" sz="1500" dirty="0" err="1" smtClean="0"/>
-              <a:t>prey</a:t>
+              <a:t>success</a:t>
             </a:r>
             <a:endParaRPr lang="fr-CA" sz="1500" dirty="0"/>
           </a:p>
@@ -3258,7 +3251,7 @@
         </p:nvSpPr>
         <p:spPr>
           <a:xfrm rot="16200000">
-            <a:off x="-1048355" y="4696592"/>
+            <a:off x="-1048355" y="4599607"/>
             <a:ext cx="2667305" cy="329229"/>
           </a:xfrm>
           <a:prstGeom prst="rect">
@@ -3272,25 +3265,18 @@
           </a:bodyPr>
           <a:lstStyle/>
           <a:p>
+            <a:pPr algn="ctr"/>
             <a:r>
               <a:rPr lang="fr-CA" sz="1500" dirty="0" err="1" smtClean="0"/>
-              <a:t>Probability</a:t>
+              <a:t>Hunting</a:t>
             </a:r>
             <a:r>
               <a:rPr lang="fr-CA" sz="1500" dirty="0" smtClean="0"/>
-              <a:t> of </a:t>
+              <a:t> </a:t>
             </a:r>
             <a:r>
               <a:rPr lang="fr-CA" sz="1500" dirty="0" err="1" smtClean="0"/>
-              <a:t>capturing</a:t>
-            </a:r>
-            <a:r>
-              <a:rPr lang="fr-CA" sz="1500" dirty="0" smtClean="0"/>
-              <a:t> 4 </a:t>
-            </a:r>
-            <a:r>
-              <a:rPr lang="fr-CA" sz="1500" dirty="0" err="1" smtClean="0"/>
-              <a:t>prey</a:t>
+              <a:t>success</a:t>
             </a:r>
             <a:endParaRPr lang="fr-CA" sz="1500" dirty="0"/>
           </a:p>
@@ -4840,25 +4826,18 @@
             </a:bodyPr>
             <a:lstStyle/>
             <a:p>
+              <a:pPr algn="ctr"/>
               <a:r>
                 <a:rPr lang="fr-CA" sz="1500" dirty="0" err="1" smtClean="0"/>
-                <a:t>Probability</a:t>
+                <a:t>Hunting</a:t>
               </a:r>
               <a:r>
                 <a:rPr lang="fr-CA" sz="1500" dirty="0" smtClean="0"/>
-                <a:t> of </a:t>
+                <a:t> </a:t>
               </a:r>
               <a:r>
                 <a:rPr lang="fr-CA" sz="1500" dirty="0" err="1" smtClean="0"/>
-                <a:t>capturing</a:t>
-              </a:r>
-              <a:r>
-                <a:rPr lang="fr-CA" sz="1500" dirty="0" smtClean="0"/>
-                <a:t> 4 </a:t>
-              </a:r>
-              <a:r>
-                <a:rPr lang="fr-CA" sz="1500" dirty="0" err="1" smtClean="0"/>
-                <a:t>prey</a:t>
+                <a:t>success</a:t>
               </a:r>
               <a:endParaRPr lang="fr-CA" sz="1500" dirty="0"/>
             </a:p>
@@ -4872,7 +4851,7 @@
           </p:nvSpPr>
           <p:spPr>
             <a:xfrm rot="16200000">
-              <a:off x="-1048355" y="4696592"/>
+              <a:off x="-1048355" y="4599607"/>
               <a:ext cx="2667305" cy="329229"/>
             </a:xfrm>
             <a:prstGeom prst="rect">
@@ -4886,25 +4865,18 @@
             </a:bodyPr>
             <a:lstStyle/>
             <a:p>
+              <a:pPr algn="ctr"/>
               <a:r>
                 <a:rPr lang="fr-CA" sz="1500" dirty="0" err="1" smtClean="0"/>
-                <a:t>Probability</a:t>
+                <a:t>Hunting</a:t>
               </a:r>
               <a:r>
                 <a:rPr lang="fr-CA" sz="1500" dirty="0" smtClean="0"/>
-                <a:t> of </a:t>
+                <a:t> </a:t>
               </a:r>
               <a:r>
                 <a:rPr lang="fr-CA" sz="1500" dirty="0" err="1" smtClean="0"/>
-                <a:t>capturing</a:t>
-              </a:r>
-              <a:r>
-                <a:rPr lang="fr-CA" sz="1500" dirty="0" smtClean="0"/>
-                <a:t> 4 </a:t>
-              </a:r>
-              <a:r>
-                <a:rPr lang="fr-CA" sz="1500" dirty="0" err="1" smtClean="0"/>
-                <a:t>prey</a:t>
+                <a:t>success</a:t>
               </a:r>
               <a:endParaRPr lang="fr-CA" sz="1500" dirty="0"/>
             </a:p>
@@ -6192,7 +6164,7 @@
       </p:grpSpPr>
       <p:pic>
         <p:nvPicPr>
-          <p:cNvPr id="42" name="Picture 41"/>
+          <p:cNvPr id="2" name="Picture 1"/>
           <p:cNvPicPr>
             <a:picLocks noChangeAspect="1"/>
           </p:cNvPicPr>

</xml_diff>

<commit_message>
cleaned figures. arranged results order.
</commit_message>
<xml_diff>
--- a/outputs/04_figure4.pptx
+++ b/outputs/04_figure4.pptx
@@ -7,7 +7,8 @@
   <p:sldIdLst>
     <p:sldId id="257" r:id="rId2"/>
     <p:sldId id="258" r:id="rId3"/>
-    <p:sldId id="259" r:id="rId4"/>
+    <p:sldId id="260" r:id="rId4"/>
+    <p:sldId id="259" r:id="rId5"/>
   </p:sldIdLst>
   <p:sldSz cx="12192000" cy="6858000"/>
   <p:notesSz cx="6858000" cy="9144000"/>
@@ -256,7 +257,7 @@
           <a:p>
             <a:fld id="{26E3F303-E03A-4060-8A5C-CC74636C956C}" type="datetimeFigureOut">
               <a:rPr lang="fr-CA" smtClean="0"/>
-              <a:t>2021-06-03</a:t>
+              <a:t>2021-06-17</a:t>
             </a:fld>
             <a:endParaRPr lang="fr-CA"/>
           </a:p>
@@ -426,7 +427,7 @@
           <a:p>
             <a:fld id="{26E3F303-E03A-4060-8A5C-CC74636C956C}" type="datetimeFigureOut">
               <a:rPr lang="fr-CA" smtClean="0"/>
-              <a:t>2021-06-03</a:t>
+              <a:t>2021-06-17</a:t>
             </a:fld>
             <a:endParaRPr lang="fr-CA"/>
           </a:p>
@@ -606,7 +607,7 @@
           <a:p>
             <a:fld id="{26E3F303-E03A-4060-8A5C-CC74636C956C}" type="datetimeFigureOut">
               <a:rPr lang="fr-CA" smtClean="0"/>
-              <a:t>2021-06-03</a:t>
+              <a:t>2021-06-17</a:t>
             </a:fld>
             <a:endParaRPr lang="fr-CA"/>
           </a:p>
@@ -776,7 +777,7 @@
           <a:p>
             <a:fld id="{26E3F303-E03A-4060-8A5C-CC74636C956C}" type="datetimeFigureOut">
               <a:rPr lang="fr-CA" smtClean="0"/>
-              <a:t>2021-06-03</a:t>
+              <a:t>2021-06-17</a:t>
             </a:fld>
             <a:endParaRPr lang="fr-CA"/>
           </a:p>
@@ -1022,7 +1023,7 @@
           <a:p>
             <a:fld id="{26E3F303-E03A-4060-8A5C-CC74636C956C}" type="datetimeFigureOut">
               <a:rPr lang="fr-CA" smtClean="0"/>
-              <a:t>2021-06-03</a:t>
+              <a:t>2021-06-17</a:t>
             </a:fld>
             <a:endParaRPr lang="fr-CA"/>
           </a:p>
@@ -1254,7 +1255,7 @@
           <a:p>
             <a:fld id="{26E3F303-E03A-4060-8A5C-CC74636C956C}" type="datetimeFigureOut">
               <a:rPr lang="fr-CA" smtClean="0"/>
-              <a:t>2021-06-03</a:t>
+              <a:t>2021-06-17</a:t>
             </a:fld>
             <a:endParaRPr lang="fr-CA"/>
           </a:p>
@@ -1621,7 +1622,7 @@
           <a:p>
             <a:fld id="{26E3F303-E03A-4060-8A5C-CC74636C956C}" type="datetimeFigureOut">
               <a:rPr lang="fr-CA" smtClean="0"/>
-              <a:t>2021-06-03</a:t>
+              <a:t>2021-06-17</a:t>
             </a:fld>
             <a:endParaRPr lang="fr-CA"/>
           </a:p>
@@ -1739,7 +1740,7 @@
           <a:p>
             <a:fld id="{26E3F303-E03A-4060-8A5C-CC74636C956C}" type="datetimeFigureOut">
               <a:rPr lang="fr-CA" smtClean="0"/>
-              <a:t>2021-06-03</a:t>
+              <a:t>2021-06-17</a:t>
             </a:fld>
             <a:endParaRPr lang="fr-CA"/>
           </a:p>
@@ -1834,7 +1835,7 @@
           <a:p>
             <a:fld id="{26E3F303-E03A-4060-8A5C-CC74636C956C}" type="datetimeFigureOut">
               <a:rPr lang="fr-CA" smtClean="0"/>
-              <a:t>2021-06-03</a:t>
+              <a:t>2021-06-17</a:t>
             </a:fld>
             <a:endParaRPr lang="fr-CA"/>
           </a:p>
@@ -2111,7 +2112,7 @@
           <a:p>
             <a:fld id="{26E3F303-E03A-4060-8A5C-CC74636C956C}" type="datetimeFigureOut">
               <a:rPr lang="fr-CA" smtClean="0"/>
-              <a:t>2021-06-03</a:t>
+              <a:t>2021-06-17</a:t>
             </a:fld>
             <a:endParaRPr lang="fr-CA"/>
           </a:p>
@@ -2364,7 +2365,7 @@
           <a:p>
             <a:fld id="{26E3F303-E03A-4060-8A5C-CC74636C956C}" type="datetimeFigureOut">
               <a:rPr lang="fr-CA" smtClean="0"/>
-              <a:t>2021-06-03</a:t>
+              <a:t>2021-06-17</a:t>
             </a:fld>
             <a:endParaRPr lang="fr-CA"/>
           </a:p>
@@ -2577,7 +2578,7 @@
           <a:p>
             <a:fld id="{26E3F303-E03A-4060-8A5C-CC74636C956C}" type="datetimeFigureOut">
               <a:rPr lang="fr-CA" smtClean="0"/>
-              <a:t>2021-06-03</a:t>
+              <a:t>2021-06-17</a:t>
             </a:fld>
             <a:endParaRPr lang="fr-CA"/>
           </a:p>
@@ -5954,11 +5955,7 @@
               <a:pPr algn="ctr"/>
               <a:r>
                 <a:rPr lang="fr-CA" sz="1400" b="1" dirty="0" smtClean="0"/>
-                <a:t>(A</a:t>
-              </a:r>
-              <a:r>
-                <a:rPr lang="fr-CA" sz="1400" b="1" dirty="0" smtClean="0"/>
-                <a:t>)</a:t>
+                <a:t>(A)</a:t>
               </a:r>
               <a:endParaRPr lang="fr-CA" sz="1400" b="1" dirty="0"/>
             </a:p>
@@ -5989,11 +5986,7 @@
               <a:pPr algn="ctr"/>
               <a:r>
                 <a:rPr lang="fr-CA" sz="1400" b="1" dirty="0" smtClean="0"/>
-                <a:t>(B</a:t>
-              </a:r>
-              <a:r>
-                <a:rPr lang="fr-CA" sz="1400" b="1" dirty="0" smtClean="0"/>
-                <a:t>)</a:t>
+                <a:t>(B)</a:t>
               </a:r>
               <a:endParaRPr lang="fr-CA" sz="1400" b="1" dirty="0"/>
             </a:p>
@@ -6024,11 +6017,7 @@
               <a:pPr algn="ctr"/>
               <a:r>
                 <a:rPr lang="fr-CA" sz="1400" b="1" dirty="0" smtClean="0"/>
-                <a:t>(C</a:t>
-              </a:r>
-              <a:r>
-                <a:rPr lang="fr-CA" sz="1400" b="1" dirty="0" smtClean="0"/>
-                <a:t>)</a:t>
+                <a:t>(C)</a:t>
               </a:r>
               <a:endParaRPr lang="fr-CA" sz="1400" b="1" dirty="0"/>
             </a:p>
@@ -6059,11 +6048,7 @@
               <a:pPr algn="ctr"/>
               <a:r>
                 <a:rPr lang="fr-CA" sz="1400" b="1" dirty="0" smtClean="0"/>
-                <a:t>(D</a:t>
-              </a:r>
-              <a:r>
-                <a:rPr lang="fr-CA" sz="1400" b="1" dirty="0" smtClean="0"/>
-                <a:t>)</a:t>
+                <a:t>(D)</a:t>
               </a:r>
               <a:endParaRPr lang="fr-CA" sz="1400" b="1" dirty="0"/>
             </a:p>
@@ -6094,11 +6079,7 @@
               <a:pPr algn="ctr"/>
               <a:r>
                 <a:rPr lang="fr-CA" sz="1400" b="1" dirty="0" smtClean="0"/>
-                <a:t>(E</a:t>
-              </a:r>
-              <a:r>
-                <a:rPr lang="fr-CA" sz="1400" b="1" dirty="0" smtClean="0"/>
-                <a:t>)</a:t>
+                <a:t>(E)</a:t>
               </a:r>
               <a:endParaRPr lang="fr-CA" sz="1400" b="1" dirty="0"/>
             </a:p>
@@ -6129,11 +6110,7 @@
               <a:pPr algn="ctr"/>
               <a:r>
                 <a:rPr lang="fr-CA" sz="1400" b="1" dirty="0" smtClean="0"/>
-                <a:t>(F</a:t>
-              </a:r>
-              <a:r>
-                <a:rPr lang="fr-CA" sz="1400" b="1" dirty="0" smtClean="0"/>
-                <a:t>)</a:t>
+                <a:t>(F)</a:t>
               </a:r>
               <a:endParaRPr lang="fr-CA" sz="1400" b="1" dirty="0"/>
             </a:p>
@@ -6154,6 +6131,1536 @@
 </file>
 
 <file path=ppt/slides/slide3.xml><?xml version="1.0" encoding="utf-8"?>
+<p:sld xmlns:a="http://schemas.openxmlformats.org/drawingml/2006/main" xmlns:r="http://schemas.openxmlformats.org/officeDocument/2006/relationships" xmlns:p="http://schemas.openxmlformats.org/presentationml/2006/main">
+  <p:cSld>
+    <p:spTree>
+      <p:nvGrpSpPr>
+        <p:cNvPr id="1" name=""/>
+        <p:cNvGrpSpPr/>
+        <p:nvPr/>
+      </p:nvGrpSpPr>
+      <p:grpSpPr>
+        <a:xfrm>
+          <a:off x="0" y="0"/>
+          <a:ext cx="0" cy="0"/>
+          <a:chOff x="0" y="0"/>
+          <a:chExt cx="0" cy="0"/>
+        </a:xfrm>
+      </p:grpSpPr>
+      <p:grpSp>
+        <p:nvGrpSpPr>
+          <p:cNvPr id="2" name="Group 1"/>
+          <p:cNvGrpSpPr/>
+          <p:nvPr/>
+        </p:nvGrpSpPr>
+        <p:grpSpPr>
+          <a:xfrm>
+            <a:off x="120683" y="118813"/>
+            <a:ext cx="10983380" cy="6496198"/>
+            <a:chOff x="120683" y="118813"/>
+            <a:chExt cx="10983380" cy="6496198"/>
+          </a:xfrm>
+        </p:grpSpPr>
+        <p:pic>
+          <p:nvPicPr>
+            <p:cNvPr id="42" name="Picture 41"/>
+            <p:cNvPicPr>
+              <a:picLocks noChangeAspect="1"/>
+            </p:cNvPicPr>
+            <p:nvPr/>
+          </p:nvPicPr>
+          <p:blipFill rotWithShape="1">
+            <a:blip r:embed="rId2">
+              <a:extLst>
+                <a:ext uri="{28A0092B-C50C-407E-A947-70E740481C1C}">
+                  <a14:useLocalDpi xmlns:a14="http://schemas.microsoft.com/office/drawing/2010/main" val="0"/>
+                </a:ext>
+              </a:extLst>
+            </a:blip>
+            <a:srcRect l="29204" t="13425" r="28864" b="8714"/>
+            <a:stretch/>
+          </p:blipFill>
+          <p:spPr>
+            <a:xfrm>
+              <a:off x="683200" y="332177"/>
+              <a:ext cx="3411672" cy="2903157"/>
+            </a:xfrm>
+            <a:prstGeom prst="rect">
+              <a:avLst/>
+            </a:prstGeom>
+          </p:spPr>
+        </p:pic>
+        <p:pic>
+          <p:nvPicPr>
+            <p:cNvPr id="43" name="Picture 42"/>
+            <p:cNvPicPr>
+              <a:picLocks noChangeAspect="1"/>
+            </p:cNvPicPr>
+            <p:nvPr/>
+          </p:nvPicPr>
+          <p:blipFill rotWithShape="1">
+            <a:blip r:embed="rId3">
+              <a:extLst>
+                <a:ext uri="{28A0092B-C50C-407E-A947-70E740481C1C}">
+                  <a14:useLocalDpi xmlns:a14="http://schemas.microsoft.com/office/drawing/2010/main" val="0"/>
+                </a:ext>
+              </a:extLst>
+            </a:blip>
+            <a:srcRect l="30113" t="12433" r="28864" b="9954"/>
+            <a:stretch/>
+          </p:blipFill>
+          <p:spPr>
+            <a:xfrm>
+              <a:off x="4143501" y="332178"/>
+              <a:ext cx="3348368" cy="2903156"/>
+            </a:xfrm>
+            <a:prstGeom prst="rect">
+              <a:avLst/>
+            </a:prstGeom>
+          </p:spPr>
+        </p:pic>
+        <p:pic>
+          <p:nvPicPr>
+            <p:cNvPr id="44" name="Picture 43"/>
+            <p:cNvPicPr>
+              <a:picLocks noChangeAspect="1"/>
+            </p:cNvPicPr>
+            <p:nvPr/>
+          </p:nvPicPr>
+          <p:blipFill rotWithShape="1">
+            <a:blip r:embed="rId4">
+              <a:extLst>
+                <a:ext uri="{28A0092B-C50C-407E-A947-70E740481C1C}">
+                  <a14:useLocalDpi xmlns:a14="http://schemas.microsoft.com/office/drawing/2010/main" val="0"/>
+                </a:ext>
+              </a:extLst>
+            </a:blip>
+            <a:srcRect l="30795" t="14169" r="27955" b="8218"/>
+            <a:stretch/>
+          </p:blipFill>
+          <p:spPr>
+            <a:xfrm>
+              <a:off x="7576066" y="332177"/>
+              <a:ext cx="3366921" cy="2903157"/>
+            </a:xfrm>
+            <a:prstGeom prst="rect">
+              <a:avLst/>
+            </a:prstGeom>
+          </p:spPr>
+        </p:pic>
+        <p:pic>
+          <p:nvPicPr>
+            <p:cNvPr id="45" name="Picture 44"/>
+            <p:cNvPicPr>
+              <a:picLocks noChangeAspect="1"/>
+            </p:cNvPicPr>
+            <p:nvPr/>
+          </p:nvPicPr>
+          <p:blipFill rotWithShape="1">
+            <a:blip r:embed="rId5">
+              <a:extLst>
+                <a:ext uri="{28A0092B-C50C-407E-A947-70E740481C1C}">
+                  <a14:useLocalDpi xmlns:a14="http://schemas.microsoft.com/office/drawing/2010/main" val="0"/>
+                </a:ext>
+              </a:extLst>
+            </a:blip>
+            <a:srcRect l="31364" t="13921" r="28181" b="9705"/>
+            <a:stretch/>
+          </p:blipFill>
+          <p:spPr>
+            <a:xfrm>
+              <a:off x="7680624" y="3567530"/>
+              <a:ext cx="3362885" cy="2909462"/>
+            </a:xfrm>
+            <a:prstGeom prst="rect">
+              <a:avLst/>
+            </a:prstGeom>
+          </p:spPr>
+        </p:pic>
+        <p:pic>
+          <p:nvPicPr>
+            <p:cNvPr id="46" name="Picture 45"/>
+            <p:cNvPicPr>
+              <a:picLocks noChangeAspect="1"/>
+            </p:cNvPicPr>
+            <p:nvPr/>
+          </p:nvPicPr>
+          <p:blipFill rotWithShape="1">
+            <a:blip r:embed="rId6">
+              <a:extLst>
+                <a:ext uri="{28A0092B-C50C-407E-A947-70E740481C1C}">
+                  <a14:useLocalDpi xmlns:a14="http://schemas.microsoft.com/office/drawing/2010/main" val="0"/>
+                </a:ext>
+              </a:extLst>
+            </a:blip>
+            <a:srcRect l="32841" t="15160" r="28637" b="10946"/>
+            <a:stretch/>
+          </p:blipFill>
+          <p:spPr>
+            <a:xfrm>
+              <a:off x="679895" y="3548329"/>
+              <a:ext cx="3345570" cy="2940944"/>
+            </a:xfrm>
+            <a:prstGeom prst="rect">
+              <a:avLst/>
+            </a:prstGeom>
+          </p:spPr>
+        </p:pic>
+        <p:pic>
+          <p:nvPicPr>
+            <p:cNvPr id="47" name="Picture 46"/>
+            <p:cNvPicPr>
+              <a:picLocks noChangeAspect="1"/>
+            </p:cNvPicPr>
+            <p:nvPr/>
+          </p:nvPicPr>
+          <p:blipFill rotWithShape="1">
+            <a:blip r:embed="rId7">
+              <a:extLst>
+                <a:ext uri="{28A0092B-C50C-407E-A947-70E740481C1C}">
+                  <a14:useLocalDpi xmlns:a14="http://schemas.microsoft.com/office/drawing/2010/main" val="0"/>
+                </a:ext>
+              </a:extLst>
+            </a:blip>
+            <a:srcRect l="30681" t="14664" r="29432" b="11441"/>
+            <a:stretch/>
+          </p:blipFill>
+          <p:spPr>
+            <a:xfrm>
+              <a:off x="4119077" y="3527554"/>
+              <a:ext cx="3463996" cy="2940944"/>
+            </a:xfrm>
+            <a:prstGeom prst="rect">
+              <a:avLst/>
+            </a:prstGeom>
+          </p:spPr>
+        </p:pic>
+        <p:sp>
+          <p:nvSpPr>
+            <p:cNvPr id="48" name="TextBox 47"/>
+            <p:cNvSpPr txBox="1"/>
+            <p:nvPr/>
+          </p:nvSpPr>
+          <p:spPr>
+            <a:xfrm rot="16200000">
+              <a:off x="-1021780" y="1466736"/>
+              <a:ext cx="2667305" cy="329229"/>
+            </a:xfrm>
+            <a:prstGeom prst="rect">
+              <a:avLst/>
+            </a:prstGeom>
+            <a:noFill/>
+          </p:spPr>
+          <p:txBody>
+            <a:bodyPr wrap="square" rtlCol="0">
+              <a:spAutoFit/>
+            </a:bodyPr>
+            <a:lstStyle/>
+            <a:p>
+              <a:pPr algn="ctr"/>
+              <a:r>
+                <a:rPr lang="fr-CA" sz="1500" dirty="0" err="1" smtClean="0"/>
+                <a:t>Hunting</a:t>
+              </a:r>
+              <a:r>
+                <a:rPr lang="fr-CA" sz="1500" dirty="0" smtClean="0"/>
+                <a:t> </a:t>
+              </a:r>
+              <a:r>
+                <a:rPr lang="fr-CA" sz="1500" dirty="0" err="1" smtClean="0"/>
+                <a:t>success</a:t>
+              </a:r>
+              <a:endParaRPr lang="fr-CA" sz="1500" dirty="0"/>
+            </a:p>
+          </p:txBody>
+        </p:sp>
+        <p:sp>
+          <p:nvSpPr>
+            <p:cNvPr id="49" name="TextBox 48"/>
+            <p:cNvSpPr txBox="1"/>
+            <p:nvPr/>
+          </p:nvSpPr>
+          <p:spPr>
+            <a:xfrm rot="16200000">
+              <a:off x="-1048355" y="4599607"/>
+              <a:ext cx="2667305" cy="329229"/>
+            </a:xfrm>
+            <a:prstGeom prst="rect">
+              <a:avLst/>
+            </a:prstGeom>
+            <a:noFill/>
+          </p:spPr>
+          <p:txBody>
+            <a:bodyPr wrap="square" rtlCol="0">
+              <a:spAutoFit/>
+            </a:bodyPr>
+            <a:lstStyle/>
+            <a:p>
+              <a:pPr algn="ctr"/>
+              <a:r>
+                <a:rPr lang="fr-CA" sz="1500" dirty="0" err="1" smtClean="0"/>
+                <a:t>Hunting</a:t>
+              </a:r>
+              <a:r>
+                <a:rPr lang="fr-CA" sz="1500" dirty="0" smtClean="0"/>
+                <a:t> </a:t>
+              </a:r>
+              <a:r>
+                <a:rPr lang="fr-CA" sz="1500" dirty="0" err="1" smtClean="0"/>
+                <a:t>success</a:t>
+              </a:r>
+              <a:endParaRPr lang="fr-CA" sz="1500" dirty="0"/>
+            </a:p>
+          </p:txBody>
+        </p:sp>
+        <p:sp>
+          <p:nvSpPr>
+            <p:cNvPr id="50" name="Rectangle 49"/>
+            <p:cNvSpPr/>
+            <p:nvPr/>
+          </p:nvSpPr>
+          <p:spPr>
+            <a:xfrm rot="688942">
+              <a:off x="1141965" y="3001398"/>
+              <a:ext cx="971294" cy="153201"/>
+            </a:xfrm>
+            <a:prstGeom prst="rect">
+              <a:avLst/>
+            </a:prstGeom>
+            <a:solidFill>
+              <a:schemeClr val="bg1"/>
+            </a:solidFill>
+            <a:ln>
+              <a:solidFill>
+                <a:schemeClr val="bg1"/>
+              </a:solidFill>
+            </a:ln>
+          </p:spPr>
+          <p:style>
+            <a:lnRef idx="2">
+              <a:schemeClr val="accent1">
+                <a:shade val="50000"/>
+              </a:schemeClr>
+            </a:lnRef>
+            <a:fillRef idx="1">
+              <a:schemeClr val="accent1"/>
+            </a:fillRef>
+            <a:effectRef idx="0">
+              <a:schemeClr val="accent1"/>
+            </a:effectRef>
+            <a:fontRef idx="minor">
+              <a:schemeClr val="lt1"/>
+            </a:fontRef>
+          </p:style>
+          <p:txBody>
+            <a:bodyPr rtlCol="0" anchor="ctr"/>
+            <a:lstStyle/>
+            <a:p>
+              <a:pPr algn="ctr"/>
+              <a:endParaRPr lang="fr-CA"/>
+            </a:p>
+          </p:txBody>
+        </p:sp>
+        <p:sp>
+          <p:nvSpPr>
+            <p:cNvPr id="51" name="Rectangle 50"/>
+            <p:cNvSpPr/>
+            <p:nvPr/>
+          </p:nvSpPr>
+          <p:spPr>
+            <a:xfrm rot="17669751">
+              <a:off x="3347502" y="2788715"/>
+              <a:ext cx="971294" cy="153201"/>
+            </a:xfrm>
+            <a:prstGeom prst="rect">
+              <a:avLst/>
+            </a:prstGeom>
+            <a:solidFill>
+              <a:schemeClr val="bg1"/>
+            </a:solidFill>
+            <a:ln>
+              <a:solidFill>
+                <a:schemeClr val="bg1"/>
+              </a:solidFill>
+            </a:ln>
+          </p:spPr>
+          <p:style>
+            <a:lnRef idx="2">
+              <a:schemeClr val="accent1">
+                <a:shade val="50000"/>
+              </a:schemeClr>
+            </a:lnRef>
+            <a:fillRef idx="1">
+              <a:schemeClr val="accent1"/>
+            </a:fillRef>
+            <a:effectRef idx="0">
+              <a:schemeClr val="accent1"/>
+            </a:effectRef>
+            <a:fontRef idx="minor">
+              <a:schemeClr val="lt1"/>
+            </a:fontRef>
+          </p:style>
+          <p:txBody>
+            <a:bodyPr rtlCol="0" anchor="ctr"/>
+            <a:lstStyle/>
+            <a:p>
+              <a:pPr algn="ctr"/>
+              <a:endParaRPr lang="fr-CA"/>
+            </a:p>
+          </p:txBody>
+        </p:sp>
+        <p:sp>
+          <p:nvSpPr>
+            <p:cNvPr id="52" name="Rectangle 51"/>
+            <p:cNvSpPr/>
+            <p:nvPr/>
+          </p:nvSpPr>
+          <p:spPr>
+            <a:xfrm rot="688942">
+              <a:off x="4609877" y="2973689"/>
+              <a:ext cx="971294" cy="153201"/>
+            </a:xfrm>
+            <a:prstGeom prst="rect">
+              <a:avLst/>
+            </a:prstGeom>
+            <a:solidFill>
+              <a:schemeClr val="bg1"/>
+            </a:solidFill>
+            <a:ln>
+              <a:solidFill>
+                <a:schemeClr val="bg1"/>
+              </a:solidFill>
+            </a:ln>
+          </p:spPr>
+          <p:style>
+            <a:lnRef idx="2">
+              <a:schemeClr val="accent1">
+                <a:shade val="50000"/>
+              </a:schemeClr>
+            </a:lnRef>
+            <a:fillRef idx="1">
+              <a:schemeClr val="accent1"/>
+            </a:fillRef>
+            <a:effectRef idx="0">
+              <a:schemeClr val="accent1"/>
+            </a:effectRef>
+            <a:fontRef idx="minor">
+              <a:schemeClr val="lt1"/>
+            </a:fontRef>
+          </p:style>
+          <p:txBody>
+            <a:bodyPr rtlCol="0" anchor="ctr"/>
+            <a:lstStyle/>
+            <a:p>
+              <a:pPr algn="ctr"/>
+              <a:endParaRPr lang="fr-CA"/>
+            </a:p>
+          </p:txBody>
+        </p:sp>
+        <p:sp>
+          <p:nvSpPr>
+            <p:cNvPr id="53" name="Rectangle 52"/>
+            <p:cNvSpPr/>
+            <p:nvPr/>
+          </p:nvSpPr>
+          <p:spPr>
+            <a:xfrm rot="17815025">
+              <a:off x="6770511" y="2788714"/>
+              <a:ext cx="971294" cy="153201"/>
+            </a:xfrm>
+            <a:prstGeom prst="rect">
+              <a:avLst/>
+            </a:prstGeom>
+            <a:solidFill>
+              <a:schemeClr val="bg1"/>
+            </a:solidFill>
+            <a:ln>
+              <a:solidFill>
+                <a:schemeClr val="bg1"/>
+              </a:solidFill>
+            </a:ln>
+          </p:spPr>
+          <p:style>
+            <a:lnRef idx="2">
+              <a:schemeClr val="accent1">
+                <a:shade val="50000"/>
+              </a:schemeClr>
+            </a:lnRef>
+            <a:fillRef idx="1">
+              <a:schemeClr val="accent1"/>
+            </a:fillRef>
+            <a:effectRef idx="0">
+              <a:schemeClr val="accent1"/>
+            </a:effectRef>
+            <a:fontRef idx="minor">
+              <a:schemeClr val="lt1"/>
+            </a:fontRef>
+          </p:style>
+          <p:txBody>
+            <a:bodyPr rtlCol="0" anchor="ctr"/>
+            <a:lstStyle/>
+            <a:p>
+              <a:pPr algn="ctr"/>
+              <a:endParaRPr lang="fr-CA"/>
+            </a:p>
+          </p:txBody>
+        </p:sp>
+        <p:sp>
+          <p:nvSpPr>
+            <p:cNvPr id="54" name="Rectangle 53"/>
+            <p:cNvSpPr/>
+            <p:nvPr/>
+          </p:nvSpPr>
+          <p:spPr>
+            <a:xfrm rot="19475592">
+              <a:off x="10178235" y="2759326"/>
+              <a:ext cx="836742" cy="166163"/>
+            </a:xfrm>
+            <a:prstGeom prst="rect">
+              <a:avLst/>
+            </a:prstGeom>
+            <a:solidFill>
+              <a:schemeClr val="bg1"/>
+            </a:solidFill>
+            <a:ln>
+              <a:solidFill>
+                <a:schemeClr val="bg1"/>
+              </a:solidFill>
+            </a:ln>
+          </p:spPr>
+          <p:style>
+            <a:lnRef idx="2">
+              <a:schemeClr val="accent1">
+                <a:shade val="50000"/>
+              </a:schemeClr>
+            </a:lnRef>
+            <a:fillRef idx="1">
+              <a:schemeClr val="accent1"/>
+            </a:fillRef>
+            <a:effectRef idx="0">
+              <a:schemeClr val="accent1"/>
+            </a:effectRef>
+            <a:fontRef idx="minor">
+              <a:schemeClr val="lt1"/>
+            </a:fontRef>
+          </p:style>
+          <p:txBody>
+            <a:bodyPr rtlCol="0" anchor="ctr"/>
+            <a:lstStyle/>
+            <a:p>
+              <a:pPr algn="ctr"/>
+              <a:endParaRPr lang="fr-CA"/>
+            </a:p>
+          </p:txBody>
+        </p:sp>
+        <p:sp>
+          <p:nvSpPr>
+            <p:cNvPr id="55" name="Rectangle 54"/>
+            <p:cNvSpPr/>
+            <p:nvPr/>
+          </p:nvSpPr>
+          <p:spPr>
+            <a:xfrm rot="18903860">
+              <a:off x="10267321" y="5914298"/>
+              <a:ext cx="836742" cy="166163"/>
+            </a:xfrm>
+            <a:prstGeom prst="rect">
+              <a:avLst/>
+            </a:prstGeom>
+            <a:solidFill>
+              <a:schemeClr val="bg1"/>
+            </a:solidFill>
+            <a:ln>
+              <a:solidFill>
+                <a:schemeClr val="bg1"/>
+              </a:solidFill>
+            </a:ln>
+          </p:spPr>
+          <p:style>
+            <a:lnRef idx="2">
+              <a:schemeClr val="accent1">
+                <a:shade val="50000"/>
+              </a:schemeClr>
+            </a:lnRef>
+            <a:fillRef idx="1">
+              <a:schemeClr val="accent1"/>
+            </a:fillRef>
+            <a:effectRef idx="0">
+              <a:schemeClr val="accent1"/>
+            </a:effectRef>
+            <a:fontRef idx="minor">
+              <a:schemeClr val="lt1"/>
+            </a:fontRef>
+          </p:style>
+          <p:txBody>
+            <a:bodyPr rtlCol="0" anchor="ctr"/>
+            <a:lstStyle/>
+            <a:p>
+              <a:pPr algn="ctr"/>
+              <a:endParaRPr lang="fr-CA"/>
+            </a:p>
+          </p:txBody>
+        </p:sp>
+        <p:sp>
+          <p:nvSpPr>
+            <p:cNvPr id="56" name="Rectangle 55"/>
+            <p:cNvSpPr/>
+            <p:nvPr/>
+          </p:nvSpPr>
+          <p:spPr>
+            <a:xfrm rot="19866327">
+              <a:off x="6769473" y="5970828"/>
+              <a:ext cx="836742" cy="166163"/>
+            </a:xfrm>
+            <a:prstGeom prst="rect">
+              <a:avLst/>
+            </a:prstGeom>
+            <a:solidFill>
+              <a:schemeClr val="bg1"/>
+            </a:solidFill>
+            <a:ln>
+              <a:solidFill>
+                <a:schemeClr val="bg1"/>
+              </a:solidFill>
+            </a:ln>
+          </p:spPr>
+          <p:style>
+            <a:lnRef idx="2">
+              <a:schemeClr val="accent1">
+                <a:shade val="50000"/>
+              </a:schemeClr>
+            </a:lnRef>
+            <a:fillRef idx="1">
+              <a:schemeClr val="accent1"/>
+            </a:fillRef>
+            <a:effectRef idx="0">
+              <a:schemeClr val="accent1"/>
+            </a:effectRef>
+            <a:fontRef idx="minor">
+              <a:schemeClr val="lt1"/>
+            </a:fontRef>
+          </p:style>
+          <p:txBody>
+            <a:bodyPr rtlCol="0" anchor="ctr"/>
+            <a:lstStyle/>
+            <a:p>
+              <a:pPr algn="ctr"/>
+              <a:endParaRPr lang="fr-CA"/>
+            </a:p>
+          </p:txBody>
+        </p:sp>
+        <p:sp>
+          <p:nvSpPr>
+            <p:cNvPr id="57" name="Rectangle 56"/>
+            <p:cNvSpPr/>
+            <p:nvPr/>
+          </p:nvSpPr>
+          <p:spPr>
+            <a:xfrm rot="20376971">
+              <a:off x="2996891" y="6084224"/>
+              <a:ext cx="836742" cy="166163"/>
+            </a:xfrm>
+            <a:prstGeom prst="rect">
+              <a:avLst/>
+            </a:prstGeom>
+            <a:solidFill>
+              <a:schemeClr val="bg1"/>
+            </a:solidFill>
+            <a:ln>
+              <a:solidFill>
+                <a:schemeClr val="bg1"/>
+              </a:solidFill>
+            </a:ln>
+          </p:spPr>
+          <p:style>
+            <a:lnRef idx="2">
+              <a:schemeClr val="accent1">
+                <a:shade val="50000"/>
+              </a:schemeClr>
+            </a:lnRef>
+            <a:fillRef idx="1">
+              <a:schemeClr val="accent1"/>
+            </a:fillRef>
+            <a:effectRef idx="0">
+              <a:schemeClr val="accent1"/>
+            </a:effectRef>
+            <a:fontRef idx="minor">
+              <a:schemeClr val="lt1"/>
+            </a:fontRef>
+          </p:style>
+          <p:txBody>
+            <a:bodyPr rtlCol="0" anchor="ctr"/>
+            <a:lstStyle/>
+            <a:p>
+              <a:pPr algn="ctr"/>
+              <a:endParaRPr lang="fr-CA"/>
+            </a:p>
+          </p:txBody>
+        </p:sp>
+        <p:sp>
+          <p:nvSpPr>
+            <p:cNvPr id="58" name="Rectangle 57"/>
+            <p:cNvSpPr/>
+            <p:nvPr/>
+          </p:nvSpPr>
+          <p:spPr>
+            <a:xfrm rot="2453192">
+              <a:off x="597990" y="6011879"/>
+              <a:ext cx="971294" cy="153201"/>
+            </a:xfrm>
+            <a:prstGeom prst="rect">
+              <a:avLst/>
+            </a:prstGeom>
+            <a:solidFill>
+              <a:schemeClr val="bg1"/>
+            </a:solidFill>
+            <a:ln>
+              <a:solidFill>
+                <a:schemeClr val="bg1"/>
+              </a:solidFill>
+            </a:ln>
+          </p:spPr>
+          <p:style>
+            <a:lnRef idx="2">
+              <a:schemeClr val="accent1">
+                <a:shade val="50000"/>
+              </a:schemeClr>
+            </a:lnRef>
+            <a:fillRef idx="1">
+              <a:schemeClr val="accent1"/>
+            </a:fillRef>
+            <a:effectRef idx="0">
+              <a:schemeClr val="accent1"/>
+            </a:effectRef>
+            <a:fontRef idx="minor">
+              <a:schemeClr val="lt1"/>
+            </a:fontRef>
+          </p:style>
+          <p:txBody>
+            <a:bodyPr rtlCol="0" anchor="ctr"/>
+            <a:lstStyle/>
+            <a:p>
+              <a:pPr algn="ctr"/>
+              <a:endParaRPr lang="fr-CA"/>
+            </a:p>
+          </p:txBody>
+        </p:sp>
+        <p:sp>
+          <p:nvSpPr>
+            <p:cNvPr id="59" name="Rectangle 58"/>
+            <p:cNvSpPr/>
+            <p:nvPr/>
+          </p:nvSpPr>
+          <p:spPr>
+            <a:xfrm rot="1132579">
+              <a:off x="4273808" y="6076694"/>
+              <a:ext cx="971294" cy="153201"/>
+            </a:xfrm>
+            <a:prstGeom prst="rect">
+              <a:avLst/>
+            </a:prstGeom>
+            <a:solidFill>
+              <a:schemeClr val="bg1"/>
+            </a:solidFill>
+            <a:ln>
+              <a:solidFill>
+                <a:schemeClr val="bg1"/>
+              </a:solidFill>
+            </a:ln>
+          </p:spPr>
+          <p:style>
+            <a:lnRef idx="2">
+              <a:schemeClr val="accent1">
+                <a:shade val="50000"/>
+              </a:schemeClr>
+            </a:lnRef>
+            <a:fillRef idx="1">
+              <a:schemeClr val="accent1"/>
+            </a:fillRef>
+            <a:effectRef idx="0">
+              <a:schemeClr val="accent1"/>
+            </a:effectRef>
+            <a:fontRef idx="minor">
+              <a:schemeClr val="lt1"/>
+            </a:fontRef>
+          </p:style>
+          <p:txBody>
+            <a:bodyPr rtlCol="0" anchor="ctr"/>
+            <a:lstStyle/>
+            <a:p>
+              <a:pPr algn="ctr"/>
+              <a:endParaRPr lang="fr-CA"/>
+            </a:p>
+          </p:txBody>
+        </p:sp>
+        <p:sp>
+          <p:nvSpPr>
+            <p:cNvPr id="60" name="TextBox 59"/>
+            <p:cNvSpPr txBox="1"/>
+            <p:nvPr/>
+          </p:nvSpPr>
+          <p:spPr>
+            <a:xfrm>
+              <a:off x="1388069" y="3018515"/>
+              <a:ext cx="934874" cy="523220"/>
+            </a:xfrm>
+            <a:prstGeom prst="rect">
+              <a:avLst/>
+            </a:prstGeom>
+            <a:noFill/>
+          </p:spPr>
+          <p:txBody>
+            <a:bodyPr wrap="square" rtlCol="0">
+              <a:spAutoFit/>
+            </a:bodyPr>
+            <a:lstStyle/>
+            <a:p>
+              <a:pPr algn="ctr"/>
+              <a:r>
+                <a:rPr lang="fr-CA" sz="1400" dirty="0" err="1" smtClean="0"/>
+                <a:t>Predator</a:t>
+              </a:r>
+              <a:r>
+                <a:rPr lang="fr-CA" sz="1400" dirty="0" smtClean="0"/>
+                <a:t> </a:t>
+              </a:r>
+            </a:p>
+            <a:p>
+              <a:pPr algn="ctr"/>
+              <a:r>
+                <a:rPr lang="fr-CA" sz="1400" dirty="0" smtClean="0"/>
+                <a:t>speed</a:t>
+              </a:r>
+              <a:endParaRPr lang="fr-CA" sz="1400" dirty="0"/>
+            </a:p>
+          </p:txBody>
+        </p:sp>
+        <p:sp>
+          <p:nvSpPr>
+            <p:cNvPr id="61" name="Rectangle 60"/>
+            <p:cNvSpPr/>
+            <p:nvPr/>
+          </p:nvSpPr>
+          <p:spPr>
+            <a:xfrm rot="1269044">
+              <a:off x="7729023" y="2857943"/>
+              <a:ext cx="971294" cy="153201"/>
+            </a:xfrm>
+            <a:prstGeom prst="rect">
+              <a:avLst/>
+            </a:prstGeom>
+            <a:solidFill>
+              <a:schemeClr val="bg1"/>
+            </a:solidFill>
+            <a:ln>
+              <a:solidFill>
+                <a:schemeClr val="bg1"/>
+              </a:solidFill>
+            </a:ln>
+          </p:spPr>
+          <p:style>
+            <a:lnRef idx="2">
+              <a:schemeClr val="accent1">
+                <a:shade val="50000"/>
+              </a:schemeClr>
+            </a:lnRef>
+            <a:fillRef idx="1">
+              <a:schemeClr val="accent1"/>
+            </a:fillRef>
+            <a:effectRef idx="0">
+              <a:schemeClr val="accent1"/>
+            </a:effectRef>
+            <a:fontRef idx="minor">
+              <a:schemeClr val="lt1"/>
+            </a:fontRef>
+          </p:style>
+          <p:txBody>
+            <a:bodyPr rtlCol="0" anchor="ctr"/>
+            <a:lstStyle/>
+            <a:p>
+              <a:pPr algn="ctr"/>
+              <a:endParaRPr lang="fr-CA"/>
+            </a:p>
+          </p:txBody>
+        </p:sp>
+        <p:sp>
+          <p:nvSpPr>
+            <p:cNvPr id="62" name="TextBox 61"/>
+            <p:cNvSpPr txBox="1"/>
+            <p:nvPr/>
+          </p:nvSpPr>
+          <p:spPr>
+            <a:xfrm>
+              <a:off x="4845030" y="3018515"/>
+              <a:ext cx="849885" cy="523220"/>
+            </a:xfrm>
+            <a:prstGeom prst="rect">
+              <a:avLst/>
+            </a:prstGeom>
+            <a:noFill/>
+          </p:spPr>
+          <p:txBody>
+            <a:bodyPr wrap="square" rtlCol="0">
+              <a:spAutoFit/>
+            </a:bodyPr>
+            <a:lstStyle/>
+            <a:p>
+              <a:pPr algn="ctr"/>
+              <a:r>
+                <a:rPr lang="fr-CA" sz="1400" dirty="0" err="1" smtClean="0"/>
+                <a:t>Predator</a:t>
+              </a:r>
+              <a:r>
+                <a:rPr lang="fr-CA" sz="1400" dirty="0" smtClean="0"/>
+                <a:t> </a:t>
+              </a:r>
+            </a:p>
+            <a:p>
+              <a:pPr algn="ctr"/>
+              <a:r>
+                <a:rPr lang="fr-CA" sz="1400" dirty="0" smtClean="0"/>
+                <a:t>speed</a:t>
+              </a:r>
+              <a:endParaRPr lang="fr-CA" sz="1400" dirty="0"/>
+            </a:p>
+          </p:txBody>
+        </p:sp>
+        <p:sp>
+          <p:nvSpPr>
+            <p:cNvPr id="63" name="Rectangle 62"/>
+            <p:cNvSpPr/>
+            <p:nvPr/>
+          </p:nvSpPr>
+          <p:spPr>
+            <a:xfrm rot="1216642">
+              <a:off x="7981199" y="6127149"/>
+              <a:ext cx="971294" cy="153201"/>
+            </a:xfrm>
+            <a:prstGeom prst="rect">
+              <a:avLst/>
+            </a:prstGeom>
+            <a:solidFill>
+              <a:schemeClr val="bg1"/>
+            </a:solidFill>
+            <a:ln>
+              <a:solidFill>
+                <a:schemeClr val="bg1"/>
+              </a:solidFill>
+            </a:ln>
+          </p:spPr>
+          <p:style>
+            <a:lnRef idx="2">
+              <a:schemeClr val="accent1">
+                <a:shade val="50000"/>
+              </a:schemeClr>
+            </a:lnRef>
+            <a:fillRef idx="1">
+              <a:schemeClr val="accent1"/>
+            </a:fillRef>
+            <a:effectRef idx="0">
+              <a:schemeClr val="accent1"/>
+            </a:effectRef>
+            <a:fontRef idx="minor">
+              <a:schemeClr val="lt1"/>
+            </a:fontRef>
+          </p:style>
+          <p:txBody>
+            <a:bodyPr rtlCol="0" anchor="ctr"/>
+            <a:lstStyle/>
+            <a:p>
+              <a:pPr algn="ctr"/>
+              <a:endParaRPr lang="fr-CA"/>
+            </a:p>
+          </p:txBody>
+        </p:sp>
+        <p:sp>
+          <p:nvSpPr>
+            <p:cNvPr id="64" name="TextBox 63"/>
+            <p:cNvSpPr txBox="1"/>
+            <p:nvPr/>
+          </p:nvSpPr>
+          <p:spPr>
+            <a:xfrm>
+              <a:off x="703300" y="6090083"/>
+              <a:ext cx="849885" cy="523220"/>
+            </a:xfrm>
+            <a:prstGeom prst="rect">
+              <a:avLst/>
+            </a:prstGeom>
+            <a:noFill/>
+          </p:spPr>
+          <p:txBody>
+            <a:bodyPr wrap="square" rtlCol="0">
+              <a:spAutoFit/>
+            </a:bodyPr>
+            <a:lstStyle/>
+            <a:p>
+              <a:pPr algn="ctr"/>
+              <a:r>
+                <a:rPr lang="fr-CA" sz="1400" dirty="0" err="1" smtClean="0"/>
+                <a:t>Predator</a:t>
+              </a:r>
+              <a:endParaRPr lang="fr-CA" sz="1400" dirty="0" smtClean="0"/>
+            </a:p>
+            <a:p>
+              <a:pPr algn="ctr"/>
+              <a:r>
+                <a:rPr lang="fr-CA" sz="1400" dirty="0" err="1" smtClean="0"/>
+                <a:t>space</a:t>
+              </a:r>
+              <a:endParaRPr lang="fr-CA" sz="1400" dirty="0"/>
+            </a:p>
+          </p:txBody>
+        </p:sp>
+        <p:sp>
+          <p:nvSpPr>
+            <p:cNvPr id="65" name="TextBox 64"/>
+            <p:cNvSpPr txBox="1"/>
+            <p:nvPr/>
+          </p:nvSpPr>
+          <p:spPr>
+            <a:xfrm>
+              <a:off x="4099305" y="6091791"/>
+              <a:ext cx="1505624" cy="523220"/>
+            </a:xfrm>
+            <a:prstGeom prst="rect">
+              <a:avLst/>
+            </a:prstGeom>
+            <a:noFill/>
+          </p:spPr>
+          <p:txBody>
+            <a:bodyPr wrap="square" rtlCol="0">
+              <a:spAutoFit/>
+            </a:bodyPr>
+            <a:lstStyle/>
+            <a:p>
+              <a:pPr algn="ctr"/>
+              <a:r>
+                <a:rPr lang="fr-CA" sz="1400" dirty="0" err="1" smtClean="0"/>
+                <a:t>Predator</a:t>
+              </a:r>
+              <a:endParaRPr lang="fr-CA" sz="1400" dirty="0" smtClean="0"/>
+            </a:p>
+            <a:p>
+              <a:pPr algn="ctr"/>
+              <a:r>
+                <a:rPr lang="fr-CA" sz="1400" dirty="0" err="1" smtClean="0"/>
+                <a:t>ambush</a:t>
+              </a:r>
+              <a:endParaRPr lang="fr-CA" sz="1400" dirty="0"/>
+            </a:p>
+          </p:txBody>
+        </p:sp>
+        <p:sp>
+          <p:nvSpPr>
+            <p:cNvPr id="66" name="TextBox 65"/>
+            <p:cNvSpPr txBox="1"/>
+            <p:nvPr/>
+          </p:nvSpPr>
+          <p:spPr>
+            <a:xfrm>
+              <a:off x="8148357" y="6090083"/>
+              <a:ext cx="849885" cy="523220"/>
+            </a:xfrm>
+            <a:prstGeom prst="rect">
+              <a:avLst/>
+            </a:prstGeom>
+            <a:noFill/>
+          </p:spPr>
+          <p:txBody>
+            <a:bodyPr wrap="square" rtlCol="0">
+              <a:spAutoFit/>
+            </a:bodyPr>
+            <a:lstStyle/>
+            <a:p>
+              <a:pPr algn="ctr"/>
+              <a:r>
+                <a:rPr lang="fr-CA" sz="1400" dirty="0" err="1" smtClean="0"/>
+                <a:t>Predator</a:t>
+              </a:r>
+              <a:endParaRPr lang="fr-CA" sz="1400" dirty="0"/>
+            </a:p>
+            <a:p>
+              <a:pPr algn="ctr"/>
+              <a:r>
+                <a:rPr lang="fr-CA" sz="1400" dirty="0" err="1" smtClean="0"/>
+                <a:t>ambush</a:t>
+              </a:r>
+              <a:endParaRPr lang="fr-CA" sz="1400" dirty="0"/>
+            </a:p>
+          </p:txBody>
+        </p:sp>
+        <p:sp>
+          <p:nvSpPr>
+            <p:cNvPr id="67" name="TextBox 66"/>
+            <p:cNvSpPr txBox="1"/>
+            <p:nvPr/>
+          </p:nvSpPr>
+          <p:spPr>
+            <a:xfrm>
+              <a:off x="3555424" y="2756905"/>
+              <a:ext cx="728778" cy="523220"/>
+            </a:xfrm>
+            <a:prstGeom prst="rect">
+              <a:avLst/>
+            </a:prstGeom>
+            <a:noFill/>
+          </p:spPr>
+          <p:txBody>
+            <a:bodyPr wrap="square" rtlCol="0">
+              <a:spAutoFit/>
+            </a:bodyPr>
+            <a:lstStyle/>
+            <a:p>
+              <a:pPr algn="ctr"/>
+              <a:r>
+                <a:rPr lang="fr-CA" sz="1400" dirty="0" smtClean="0"/>
+                <a:t>Prey </a:t>
+              </a:r>
+            </a:p>
+            <a:p>
+              <a:pPr algn="ctr"/>
+              <a:r>
+                <a:rPr lang="fr-CA" sz="1400" dirty="0" err="1" smtClean="0"/>
+                <a:t>space</a:t>
+              </a:r>
+              <a:endParaRPr lang="fr-CA" sz="1400" dirty="0"/>
+            </a:p>
+          </p:txBody>
+        </p:sp>
+        <p:sp>
+          <p:nvSpPr>
+            <p:cNvPr id="68" name="TextBox 67"/>
+            <p:cNvSpPr txBox="1"/>
+            <p:nvPr/>
+          </p:nvSpPr>
+          <p:spPr>
+            <a:xfrm>
+              <a:off x="8267115" y="3018516"/>
+              <a:ext cx="849885" cy="523220"/>
+            </a:xfrm>
+            <a:prstGeom prst="rect">
+              <a:avLst/>
+            </a:prstGeom>
+            <a:noFill/>
+          </p:spPr>
+          <p:txBody>
+            <a:bodyPr wrap="square" rtlCol="0">
+              <a:spAutoFit/>
+            </a:bodyPr>
+            <a:lstStyle/>
+            <a:p>
+              <a:pPr algn="ctr"/>
+              <a:r>
+                <a:rPr lang="fr-CA" sz="1400" dirty="0" err="1" smtClean="0"/>
+                <a:t>Predator</a:t>
+              </a:r>
+              <a:r>
+                <a:rPr lang="fr-CA" sz="1400" dirty="0" smtClean="0"/>
+                <a:t> </a:t>
+              </a:r>
+            </a:p>
+            <a:p>
+              <a:pPr algn="ctr"/>
+              <a:r>
+                <a:rPr lang="fr-CA" sz="1400" dirty="0" err="1" smtClean="0"/>
+                <a:t>space</a:t>
+              </a:r>
+              <a:endParaRPr lang="fr-CA" sz="1400" dirty="0"/>
+            </a:p>
+          </p:txBody>
+        </p:sp>
+        <p:sp>
+          <p:nvSpPr>
+            <p:cNvPr id="69" name="TextBox 68"/>
+            <p:cNvSpPr txBox="1"/>
+            <p:nvPr/>
+          </p:nvSpPr>
+          <p:spPr>
+            <a:xfrm>
+              <a:off x="6889200" y="2770662"/>
+              <a:ext cx="728778" cy="523220"/>
+            </a:xfrm>
+            <a:prstGeom prst="rect">
+              <a:avLst/>
+            </a:prstGeom>
+            <a:noFill/>
+          </p:spPr>
+          <p:txBody>
+            <a:bodyPr wrap="square" rtlCol="0">
+              <a:spAutoFit/>
+            </a:bodyPr>
+            <a:lstStyle/>
+            <a:p>
+              <a:pPr algn="ctr"/>
+              <a:r>
+                <a:rPr lang="fr-CA" sz="1400" dirty="0" smtClean="0"/>
+                <a:t>Prey </a:t>
+              </a:r>
+            </a:p>
+            <a:p>
+              <a:pPr algn="ctr"/>
+              <a:r>
+                <a:rPr lang="fr-CA" sz="1400" dirty="0" smtClean="0"/>
+                <a:t>speed</a:t>
+              </a:r>
+              <a:endParaRPr lang="fr-CA" sz="1400" dirty="0"/>
+            </a:p>
+          </p:txBody>
+        </p:sp>
+        <p:sp>
+          <p:nvSpPr>
+            <p:cNvPr id="70" name="TextBox 69"/>
+            <p:cNvSpPr txBox="1"/>
+            <p:nvPr/>
+          </p:nvSpPr>
+          <p:spPr>
+            <a:xfrm>
+              <a:off x="10013956" y="2865315"/>
+              <a:ext cx="728778" cy="523220"/>
+            </a:xfrm>
+            <a:prstGeom prst="rect">
+              <a:avLst/>
+            </a:prstGeom>
+            <a:noFill/>
+          </p:spPr>
+          <p:txBody>
+            <a:bodyPr wrap="square" rtlCol="0">
+              <a:spAutoFit/>
+            </a:bodyPr>
+            <a:lstStyle/>
+            <a:p>
+              <a:pPr algn="ctr"/>
+              <a:r>
+                <a:rPr lang="fr-CA" sz="1400" dirty="0" smtClean="0"/>
+                <a:t>Prey </a:t>
+              </a:r>
+            </a:p>
+            <a:p>
+              <a:pPr algn="ctr"/>
+              <a:r>
+                <a:rPr lang="fr-CA" sz="1400" dirty="0" smtClean="0"/>
+                <a:t>speed</a:t>
+              </a:r>
+              <a:endParaRPr lang="fr-CA" sz="1400" dirty="0"/>
+            </a:p>
+          </p:txBody>
+        </p:sp>
+        <p:sp>
+          <p:nvSpPr>
+            <p:cNvPr id="71" name="TextBox 70"/>
+            <p:cNvSpPr txBox="1"/>
+            <p:nvPr/>
+          </p:nvSpPr>
+          <p:spPr>
+            <a:xfrm>
+              <a:off x="2886158" y="6090083"/>
+              <a:ext cx="728778" cy="523220"/>
+            </a:xfrm>
+            <a:prstGeom prst="rect">
+              <a:avLst/>
+            </a:prstGeom>
+            <a:noFill/>
+          </p:spPr>
+          <p:txBody>
+            <a:bodyPr wrap="square" rtlCol="0">
+              <a:spAutoFit/>
+            </a:bodyPr>
+            <a:lstStyle/>
+            <a:p>
+              <a:pPr algn="ctr"/>
+              <a:r>
+                <a:rPr lang="fr-CA" sz="1400" dirty="0" smtClean="0"/>
+                <a:t>Prey </a:t>
+              </a:r>
+            </a:p>
+            <a:p>
+              <a:pPr algn="ctr"/>
+              <a:r>
+                <a:rPr lang="fr-CA" sz="1400" dirty="0" err="1" smtClean="0"/>
+                <a:t>space</a:t>
+              </a:r>
+              <a:endParaRPr lang="fr-CA" sz="1400" dirty="0"/>
+            </a:p>
+          </p:txBody>
+        </p:sp>
+        <p:sp>
+          <p:nvSpPr>
+            <p:cNvPr id="72" name="TextBox 71"/>
+            <p:cNvSpPr txBox="1"/>
+            <p:nvPr/>
+          </p:nvSpPr>
+          <p:spPr>
+            <a:xfrm>
+              <a:off x="6662505" y="6090083"/>
+              <a:ext cx="728778" cy="523220"/>
+            </a:xfrm>
+            <a:prstGeom prst="rect">
+              <a:avLst/>
+            </a:prstGeom>
+            <a:noFill/>
+          </p:spPr>
+          <p:txBody>
+            <a:bodyPr wrap="square" rtlCol="0">
+              <a:spAutoFit/>
+            </a:bodyPr>
+            <a:lstStyle/>
+            <a:p>
+              <a:pPr algn="ctr"/>
+              <a:r>
+                <a:rPr lang="fr-CA" sz="1400" dirty="0" smtClean="0"/>
+                <a:t>Prey </a:t>
+              </a:r>
+            </a:p>
+            <a:p>
+              <a:pPr algn="ctr"/>
+              <a:r>
+                <a:rPr lang="fr-CA" sz="1400" dirty="0" err="1" smtClean="0"/>
+                <a:t>space</a:t>
+              </a:r>
+              <a:endParaRPr lang="fr-CA" sz="1400" dirty="0"/>
+            </a:p>
+          </p:txBody>
+        </p:sp>
+        <p:sp>
+          <p:nvSpPr>
+            <p:cNvPr id="73" name="TextBox 72"/>
+            <p:cNvSpPr txBox="1"/>
+            <p:nvPr/>
+          </p:nvSpPr>
+          <p:spPr>
+            <a:xfrm>
+              <a:off x="10214209" y="6021928"/>
+              <a:ext cx="728778" cy="523220"/>
+            </a:xfrm>
+            <a:prstGeom prst="rect">
+              <a:avLst/>
+            </a:prstGeom>
+            <a:noFill/>
+          </p:spPr>
+          <p:txBody>
+            <a:bodyPr wrap="square" rtlCol="0">
+              <a:spAutoFit/>
+            </a:bodyPr>
+            <a:lstStyle/>
+            <a:p>
+              <a:pPr algn="ctr"/>
+              <a:r>
+                <a:rPr lang="fr-CA" sz="1400" dirty="0" smtClean="0"/>
+                <a:t>Prey </a:t>
+              </a:r>
+            </a:p>
+            <a:p>
+              <a:pPr algn="ctr"/>
+              <a:r>
+                <a:rPr lang="fr-CA" sz="1400" dirty="0" smtClean="0"/>
+                <a:t>speed</a:t>
+              </a:r>
+              <a:endParaRPr lang="fr-CA" sz="1400" dirty="0"/>
+            </a:p>
+          </p:txBody>
+        </p:sp>
+        <p:sp>
+          <p:nvSpPr>
+            <p:cNvPr id="74" name="TextBox 73"/>
+            <p:cNvSpPr txBox="1"/>
+            <p:nvPr/>
+          </p:nvSpPr>
+          <p:spPr>
+            <a:xfrm>
+              <a:off x="475614" y="118813"/>
+              <a:ext cx="438785" cy="307777"/>
+            </a:xfrm>
+            <a:prstGeom prst="rect">
+              <a:avLst/>
+            </a:prstGeom>
+            <a:noFill/>
+          </p:spPr>
+          <p:txBody>
+            <a:bodyPr wrap="square" rtlCol="0">
+              <a:spAutoFit/>
+            </a:bodyPr>
+            <a:lstStyle/>
+            <a:p>
+              <a:pPr algn="ctr"/>
+              <a:r>
+                <a:rPr lang="fr-CA" sz="1400" b="1" dirty="0" smtClean="0"/>
+                <a:t>(A)</a:t>
+              </a:r>
+              <a:endParaRPr lang="fr-CA" sz="1400" b="1" dirty="0"/>
+            </a:p>
+          </p:txBody>
+        </p:sp>
+        <p:sp>
+          <p:nvSpPr>
+            <p:cNvPr id="75" name="TextBox 74"/>
+            <p:cNvSpPr txBox="1"/>
+            <p:nvPr/>
+          </p:nvSpPr>
+          <p:spPr>
+            <a:xfrm>
+              <a:off x="3951480" y="118813"/>
+              <a:ext cx="396478" cy="307777"/>
+            </a:xfrm>
+            <a:prstGeom prst="rect">
+              <a:avLst/>
+            </a:prstGeom>
+            <a:noFill/>
+          </p:spPr>
+          <p:txBody>
+            <a:bodyPr wrap="square" rtlCol="0">
+              <a:spAutoFit/>
+            </a:bodyPr>
+            <a:lstStyle/>
+            <a:p>
+              <a:pPr algn="ctr"/>
+              <a:r>
+                <a:rPr lang="fr-CA" sz="1400" b="1" dirty="0" smtClean="0"/>
+                <a:t>(B)</a:t>
+              </a:r>
+              <a:endParaRPr lang="fr-CA" sz="1400" b="1" dirty="0"/>
+            </a:p>
+          </p:txBody>
+        </p:sp>
+        <p:sp>
+          <p:nvSpPr>
+            <p:cNvPr id="76" name="TextBox 75"/>
+            <p:cNvSpPr txBox="1"/>
+            <p:nvPr/>
+          </p:nvSpPr>
+          <p:spPr>
+            <a:xfrm>
+              <a:off x="7411640" y="118813"/>
+              <a:ext cx="396478" cy="307777"/>
+            </a:xfrm>
+            <a:prstGeom prst="rect">
+              <a:avLst/>
+            </a:prstGeom>
+            <a:noFill/>
+          </p:spPr>
+          <p:txBody>
+            <a:bodyPr wrap="square" rtlCol="0">
+              <a:spAutoFit/>
+            </a:bodyPr>
+            <a:lstStyle/>
+            <a:p>
+              <a:pPr algn="ctr"/>
+              <a:r>
+                <a:rPr lang="fr-CA" sz="1400" b="1" dirty="0" smtClean="0"/>
+                <a:t>(C)</a:t>
+              </a:r>
+              <a:endParaRPr lang="fr-CA" sz="1400" b="1" dirty="0"/>
+            </a:p>
+          </p:txBody>
+        </p:sp>
+        <p:sp>
+          <p:nvSpPr>
+            <p:cNvPr id="77" name="TextBox 76"/>
+            <p:cNvSpPr txBox="1"/>
+            <p:nvPr/>
+          </p:nvSpPr>
+          <p:spPr>
+            <a:xfrm>
+              <a:off x="471372" y="3349649"/>
+              <a:ext cx="415283" cy="307777"/>
+            </a:xfrm>
+            <a:prstGeom prst="rect">
+              <a:avLst/>
+            </a:prstGeom>
+            <a:noFill/>
+          </p:spPr>
+          <p:txBody>
+            <a:bodyPr wrap="square" rtlCol="0">
+              <a:spAutoFit/>
+            </a:bodyPr>
+            <a:lstStyle/>
+            <a:p>
+              <a:pPr algn="ctr"/>
+              <a:r>
+                <a:rPr lang="fr-CA" sz="1400" b="1" dirty="0" smtClean="0"/>
+                <a:t>(D)</a:t>
+              </a:r>
+              <a:endParaRPr lang="fr-CA" sz="1400" b="1" dirty="0"/>
+            </a:p>
+          </p:txBody>
+        </p:sp>
+        <p:sp>
+          <p:nvSpPr>
+            <p:cNvPr id="78" name="TextBox 77"/>
+            <p:cNvSpPr txBox="1"/>
+            <p:nvPr/>
+          </p:nvSpPr>
+          <p:spPr>
+            <a:xfrm>
+              <a:off x="3905843" y="3349648"/>
+              <a:ext cx="396478" cy="307777"/>
+            </a:xfrm>
+            <a:prstGeom prst="rect">
+              <a:avLst/>
+            </a:prstGeom>
+            <a:noFill/>
+          </p:spPr>
+          <p:txBody>
+            <a:bodyPr wrap="square" rtlCol="0">
+              <a:spAutoFit/>
+            </a:bodyPr>
+            <a:lstStyle/>
+            <a:p>
+              <a:pPr algn="ctr"/>
+              <a:r>
+                <a:rPr lang="fr-CA" sz="1400" b="1" dirty="0" smtClean="0"/>
+                <a:t>(E)</a:t>
+              </a:r>
+              <a:endParaRPr lang="fr-CA" sz="1400" b="1" dirty="0"/>
+            </a:p>
+          </p:txBody>
+        </p:sp>
+        <p:sp>
+          <p:nvSpPr>
+            <p:cNvPr id="79" name="TextBox 78"/>
+            <p:cNvSpPr txBox="1"/>
+            <p:nvPr/>
+          </p:nvSpPr>
+          <p:spPr>
+            <a:xfrm>
+              <a:off x="7411640" y="3348377"/>
+              <a:ext cx="396478" cy="307777"/>
+            </a:xfrm>
+            <a:prstGeom prst="rect">
+              <a:avLst/>
+            </a:prstGeom>
+            <a:noFill/>
+          </p:spPr>
+          <p:txBody>
+            <a:bodyPr wrap="square" rtlCol="0">
+              <a:spAutoFit/>
+            </a:bodyPr>
+            <a:lstStyle/>
+            <a:p>
+              <a:pPr algn="ctr"/>
+              <a:r>
+                <a:rPr lang="fr-CA" sz="1400" b="1" dirty="0" smtClean="0"/>
+                <a:t>(F)</a:t>
+              </a:r>
+              <a:endParaRPr lang="fr-CA" sz="1400" b="1" dirty="0"/>
+            </a:p>
+          </p:txBody>
+        </p:sp>
+      </p:grpSp>
+    </p:spTree>
+    <p:extLst>
+      <p:ext uri="{BB962C8B-B14F-4D97-AF65-F5344CB8AC3E}">
+        <p14:creationId xmlns:p14="http://schemas.microsoft.com/office/powerpoint/2010/main" val="3036338838"/>
+      </p:ext>
+    </p:extLst>
+  </p:cSld>
+  <p:clrMapOvr>
+    <a:masterClrMapping/>
+  </p:clrMapOvr>
+</p:sld>
+</file>
+
+<file path=ppt/slides/slide4.xml><?xml version="1.0" encoding="utf-8"?>
 <p:sld xmlns:a="http://schemas.openxmlformats.org/drawingml/2006/main" xmlns:r="http://schemas.openxmlformats.org/officeDocument/2006/relationships" xmlns:p="http://schemas.openxmlformats.org/presentationml/2006/main">
   <p:cSld>
     <p:spTree>

</xml_diff>